<commit_message>
rettet fejl i i præsentation
</commit_message>
<xml_diff>
--- a/Aflevering/RisikoAnalyseTabel.pptx
+++ b/Aflevering/RisikoAnalyseTabel.pptx
@@ -421,7 +421,7 @@
           <a:p>
             <a:fld id="{12241623-A064-4BED-B073-BA4D61433402}" type="datetime1">
               <a:rPr lang="en-US" smtClean="0"/>
-              <a:t>4/25/21</a:t>
+              <a:t>4/26/21</a:t>
             </a:fld>
             <a:endParaRPr lang="en-US" dirty="0"/>
           </a:p>
@@ -1232,7 +1232,7 @@
           <a:p>
             <a:fld id="{6F86ED0C-1DA7-41F0-94CF-6218B1FEDFF1}" type="datetime1">
               <a:rPr lang="en-US" smtClean="0"/>
-              <a:t>4/25/21</a:t>
+              <a:t>4/26/21</a:t>
             </a:fld>
             <a:endParaRPr lang="en-US" dirty="0"/>
           </a:p>
@@ -1431,7 +1431,7 @@
           <a:p>
             <a:fld id="{EECF02AB-6034-4B88-BC5A-7C17CB0EF809}" type="datetime1">
               <a:rPr lang="en-US" smtClean="0"/>
-              <a:t>4/25/21</a:t>
+              <a:t>4/26/21</a:t>
             </a:fld>
             <a:endParaRPr lang="en-US" dirty="0"/>
           </a:p>
@@ -1666,7 +1666,7 @@
           <a:p>
             <a:fld id="{22F3E5F3-28EE-488F-BD53-B744C06C3DEC}" type="datetime1">
               <a:rPr lang="en-US" smtClean="0"/>
-              <a:t>4/25/21</a:t>
+              <a:t>4/26/21</a:t>
             </a:fld>
             <a:endParaRPr lang="en-US" dirty="0"/>
           </a:p>
@@ -4359,7 +4359,7 @@
           <a:p>
             <a:fld id="{E72EB70D-CD01-44DA-83B3-8FEB3383D307}" type="datetime1">
               <a:rPr lang="en-US" smtClean="0"/>
-              <a:t>4/25/21</a:t>
+              <a:t>4/26/21</a:t>
             </a:fld>
             <a:endParaRPr lang="en-US" dirty="0"/>
           </a:p>
@@ -4555,7 +4555,7 @@
           <a:p>
             <a:fld id="{D0158CFD-9357-46BE-A189-D637A67C8730}" type="datetime1">
               <a:rPr lang="en-US" smtClean="0"/>
-              <a:t>4/25/21</a:t>
+              <a:t>4/26/21</a:t>
             </a:fld>
             <a:endParaRPr lang="en-US" dirty="0"/>
           </a:p>
@@ -4944,7 +4944,7 @@
           <a:p>
             <a:fld id="{7B4742EE-B331-4632-BD10-A82FED6B6FC0}" type="datetime1">
               <a:rPr lang="en-US" smtClean="0"/>
-              <a:t>4/25/21</a:t>
+              <a:t>4/26/21</a:t>
             </a:fld>
             <a:endParaRPr lang="en-US" dirty="0"/>
           </a:p>
@@ -5110,7 +5110,7 @@
           <a:p>
             <a:fld id="{451BA835-D13F-49F4-8F11-5D576AC65FAD}" type="datetime1">
               <a:rPr lang="en-US" smtClean="0"/>
-              <a:t>4/25/21</a:t>
+              <a:t>4/26/21</a:t>
             </a:fld>
             <a:endParaRPr lang="en-US" dirty="0"/>
           </a:p>
@@ -5233,7 +5233,7 @@
           <a:p>
             <a:fld id="{ADBD1799-ACB5-4CB2-86A2-5C574F1C8706}" type="datetime1">
               <a:rPr lang="en-US" smtClean="0"/>
-              <a:t>4/25/21</a:t>
+              <a:t>4/26/21</a:t>
             </a:fld>
             <a:endParaRPr lang="en-US" dirty="0"/>
           </a:p>
@@ -5543,7 +5543,7 @@
           <a:p>
             <a:fld id="{ED5DD0D6-7A82-473E-879B-C6ECD6CCCFEC}" type="datetime1">
               <a:rPr lang="en-US" smtClean="0"/>
-              <a:t>4/25/21</a:t>
+              <a:t>4/26/21</a:t>
             </a:fld>
             <a:endParaRPr lang="en-US" dirty="0"/>
           </a:p>
@@ -5843,7 +5843,7 @@
           <a:p>
             <a:fld id="{D4605E03-BC17-41A7-854C-DFAB672737DC}" type="datetime1">
               <a:rPr lang="en-US" smtClean="0"/>
-              <a:t>4/25/21</a:t>
+              <a:t>4/26/21</a:t>
             </a:fld>
             <a:endParaRPr lang="en-US" dirty="0"/>
           </a:p>
@@ -6095,7 +6095,7 @@
           <a:p>
             <a:fld id="{C4408324-A84C-4A45-93B6-78D079CCE772}" type="datetime1">
               <a:rPr lang="en-US" smtClean="0"/>
-              <a:t>4/25/21</a:t>
+              <a:t>4/26/21</a:t>
             </a:fld>
             <a:endParaRPr lang="en-US" dirty="0"/>
           </a:p>
@@ -8354,14 +8354,14 @@
             <p:ph idx="1"/>
             <p:extLst>
               <p:ext uri="{D42A27DB-BD31-4B8C-83A1-F6EECF244321}">
-                <p14:modId xmlns:p14="http://schemas.microsoft.com/office/powerpoint/2010/main" val="2448523817"/>
+                <p14:modId xmlns:p14="http://schemas.microsoft.com/office/powerpoint/2010/main" val="1338486371"/>
               </p:ext>
             </p:extLst>
           </p:nvPr>
         </p:nvGraphicFramePr>
         <p:xfrm>
           <a:off x="2377439" y="2367164"/>
-          <a:ext cx="8312787" cy="3303192"/>
+          <a:ext cx="8312787" cy="2202128"/>
         </p:xfrm>
         <a:graphic>
           <a:graphicData uri="http://schemas.openxmlformats.org/drawingml/2006/table">
@@ -9169,406 +9169,10 @@
                     <a:p>
                       <a:pPr algn="ctr" fontAlgn="b"/>
                       <a:r>
-                        <a:rPr lang="da-DK" sz="1400" u="none" strike="noStrike">
+                        <a:rPr lang="da-DK" sz="1400" u="none" strike="noStrike" dirty="0">
                           <a:effectLst/>
                         </a:rPr>
                         <a:t>18</a:t>
-                      </a:r>
-                      <a:endParaRPr lang="da-DK" sz="1400" b="0" i="0" u="none" strike="noStrike">
-                        <a:solidFill>
-                          <a:srgbClr val="000000"/>
-                        </a:solidFill>
-                        <a:effectLst/>
-                        <a:latin typeface="Calibri" panose="020F0502020204030204" pitchFamily="34" charset="0"/>
-                      </a:endParaRPr>
-                    </a:p>
-                  </a:txBody>
-                  <a:tcPr marL="11450" marR="11450" marT="11450" marB="0" anchor="b"/>
-                </a:tc>
-                <a:extLst>
-                  <a:ext uri="{0D108BD9-81ED-4DB2-BD59-A6C34878D82A}">
-                    <a16:rowId xmlns:a16="http://schemas.microsoft.com/office/drawing/2014/main" val="1642408541"/>
-                  </a:ext>
-                </a:extLst>
-              </a:tr>
-              <a:tr h="275266">
-                <a:tc>
-                  <a:txBody>
-                    <a:bodyPr/>
-                    <a:lstStyle/>
-                    <a:p>
-                      <a:pPr algn="ctr" fontAlgn="b"/>
-                      <a:r>
-                        <a:rPr lang="da-DK" sz="1400" u="none" strike="noStrike">
-                          <a:effectLst/>
-                        </a:rPr>
-                        <a:t> </a:t>
-                      </a:r>
-                      <a:endParaRPr lang="da-DK" sz="1400" b="0" i="0" u="none" strike="noStrike">
-                        <a:solidFill>
-                          <a:srgbClr val="000000"/>
-                        </a:solidFill>
-                        <a:effectLst/>
-                        <a:latin typeface="Calibri" panose="020F0502020204030204" pitchFamily="34" charset="0"/>
-                      </a:endParaRPr>
-                    </a:p>
-                  </a:txBody>
-                  <a:tcPr marL="11450" marR="11450" marT="11450" marB="0" anchor="b"/>
-                </a:tc>
-                <a:tc>
-                  <a:txBody>
-                    <a:bodyPr/>
-                    <a:lstStyle/>
-                    <a:p>
-                      <a:pPr algn="ctr" fontAlgn="b"/>
-                      <a:r>
-                        <a:rPr lang="da-DK" sz="1400" u="none" strike="noStrike">
-                          <a:effectLst/>
-                        </a:rPr>
-                        <a:t> </a:t>
-                      </a:r>
-                      <a:endParaRPr lang="da-DK" sz="1400" b="0" i="0" u="none" strike="noStrike">
-                        <a:solidFill>
-                          <a:srgbClr val="000000"/>
-                        </a:solidFill>
-                        <a:effectLst/>
-                        <a:latin typeface="Calibri" panose="020F0502020204030204" pitchFamily="34" charset="0"/>
-                      </a:endParaRPr>
-                    </a:p>
-                  </a:txBody>
-                  <a:tcPr marL="11450" marR="11450" marT="11450" marB="0" anchor="b"/>
-                </a:tc>
-                <a:tc>
-                  <a:txBody>
-                    <a:bodyPr/>
-                    <a:lstStyle/>
-                    <a:p>
-                      <a:pPr algn="ctr" fontAlgn="b"/>
-                      <a:r>
-                        <a:rPr lang="da-DK" sz="1400" u="none" strike="noStrike">
-                          <a:effectLst/>
-                        </a:rPr>
-                        <a:t> </a:t>
-                      </a:r>
-                      <a:endParaRPr lang="da-DK" sz="1400" b="0" i="0" u="none" strike="noStrike">
-                        <a:solidFill>
-                          <a:srgbClr val="000000"/>
-                        </a:solidFill>
-                        <a:effectLst/>
-                        <a:latin typeface="Calibri" panose="020F0502020204030204" pitchFamily="34" charset="0"/>
-                      </a:endParaRPr>
-                    </a:p>
-                  </a:txBody>
-                  <a:tcPr marL="11450" marR="11450" marT="11450" marB="0" anchor="b"/>
-                </a:tc>
-                <a:tc>
-                  <a:txBody>
-                    <a:bodyPr/>
-                    <a:lstStyle/>
-                    <a:p>
-                      <a:pPr algn="ctr" fontAlgn="b"/>
-                      <a:r>
-                        <a:rPr lang="da-DK" sz="1400" u="none" strike="noStrike">
-                          <a:effectLst/>
-                        </a:rPr>
-                        <a:t>0</a:t>
-                      </a:r>
-                      <a:endParaRPr lang="da-DK" sz="1400" b="0" i="0" u="none" strike="noStrike">
-                        <a:solidFill>
-                          <a:srgbClr val="000000"/>
-                        </a:solidFill>
-                        <a:effectLst/>
-                        <a:latin typeface="Calibri" panose="020F0502020204030204" pitchFamily="34" charset="0"/>
-                      </a:endParaRPr>
-                    </a:p>
-                  </a:txBody>
-                  <a:tcPr marL="11450" marR="11450" marT="11450" marB="0" anchor="b"/>
-                </a:tc>
-                <a:extLst>
-                  <a:ext uri="{0D108BD9-81ED-4DB2-BD59-A6C34878D82A}">
-                    <a16:rowId xmlns:a16="http://schemas.microsoft.com/office/drawing/2014/main" val="3041232407"/>
-                  </a:ext>
-                </a:extLst>
-              </a:tr>
-              <a:tr h="275266">
-                <a:tc>
-                  <a:txBody>
-                    <a:bodyPr/>
-                    <a:lstStyle/>
-                    <a:p>
-                      <a:pPr algn="ctr" fontAlgn="b"/>
-                      <a:r>
-                        <a:rPr lang="da-DK" sz="1400" u="none" strike="noStrike">
-                          <a:effectLst/>
-                        </a:rPr>
-                        <a:t> </a:t>
-                      </a:r>
-                      <a:endParaRPr lang="da-DK" sz="1400" b="0" i="0" u="none" strike="noStrike">
-                        <a:solidFill>
-                          <a:srgbClr val="000000"/>
-                        </a:solidFill>
-                        <a:effectLst/>
-                        <a:latin typeface="Calibri" panose="020F0502020204030204" pitchFamily="34" charset="0"/>
-                      </a:endParaRPr>
-                    </a:p>
-                  </a:txBody>
-                  <a:tcPr marL="11450" marR="11450" marT="11450" marB="0" anchor="b"/>
-                </a:tc>
-                <a:tc>
-                  <a:txBody>
-                    <a:bodyPr/>
-                    <a:lstStyle/>
-                    <a:p>
-                      <a:pPr algn="ctr" fontAlgn="b"/>
-                      <a:r>
-                        <a:rPr lang="da-DK" sz="1400" u="none" strike="noStrike">
-                          <a:effectLst/>
-                        </a:rPr>
-                        <a:t> </a:t>
-                      </a:r>
-                      <a:endParaRPr lang="da-DK" sz="1400" b="0" i="0" u="none" strike="noStrike">
-                        <a:solidFill>
-                          <a:srgbClr val="000000"/>
-                        </a:solidFill>
-                        <a:effectLst/>
-                        <a:latin typeface="Calibri" panose="020F0502020204030204" pitchFamily="34" charset="0"/>
-                      </a:endParaRPr>
-                    </a:p>
-                  </a:txBody>
-                  <a:tcPr marL="11450" marR="11450" marT="11450" marB="0" anchor="b"/>
-                </a:tc>
-                <a:tc>
-                  <a:txBody>
-                    <a:bodyPr/>
-                    <a:lstStyle/>
-                    <a:p>
-                      <a:pPr algn="ctr" fontAlgn="b"/>
-                      <a:r>
-                        <a:rPr lang="da-DK" sz="1400" u="none" strike="noStrike">
-                          <a:effectLst/>
-                        </a:rPr>
-                        <a:t> </a:t>
-                      </a:r>
-                      <a:endParaRPr lang="da-DK" sz="1400" b="0" i="0" u="none" strike="noStrike">
-                        <a:solidFill>
-                          <a:srgbClr val="000000"/>
-                        </a:solidFill>
-                        <a:effectLst/>
-                        <a:latin typeface="Calibri" panose="020F0502020204030204" pitchFamily="34" charset="0"/>
-                      </a:endParaRPr>
-                    </a:p>
-                  </a:txBody>
-                  <a:tcPr marL="11450" marR="11450" marT="11450" marB="0" anchor="b"/>
-                </a:tc>
-                <a:tc>
-                  <a:txBody>
-                    <a:bodyPr/>
-                    <a:lstStyle/>
-                    <a:p>
-                      <a:pPr algn="ctr" fontAlgn="b"/>
-                      <a:r>
-                        <a:rPr lang="da-DK" sz="1400" u="none" strike="noStrike">
-                          <a:effectLst/>
-                        </a:rPr>
-                        <a:t>0</a:t>
-                      </a:r>
-                      <a:endParaRPr lang="da-DK" sz="1400" b="0" i="0" u="none" strike="noStrike">
-                        <a:solidFill>
-                          <a:srgbClr val="000000"/>
-                        </a:solidFill>
-                        <a:effectLst/>
-                        <a:latin typeface="Calibri" panose="020F0502020204030204" pitchFamily="34" charset="0"/>
-                      </a:endParaRPr>
-                    </a:p>
-                  </a:txBody>
-                  <a:tcPr marL="11450" marR="11450" marT="11450" marB="0" anchor="b"/>
-                </a:tc>
-                <a:extLst>
-                  <a:ext uri="{0D108BD9-81ED-4DB2-BD59-A6C34878D82A}">
-                    <a16:rowId xmlns:a16="http://schemas.microsoft.com/office/drawing/2014/main" val="2261751516"/>
-                  </a:ext>
-                </a:extLst>
-              </a:tr>
-              <a:tr h="275266">
-                <a:tc>
-                  <a:txBody>
-                    <a:bodyPr/>
-                    <a:lstStyle/>
-                    <a:p>
-                      <a:pPr algn="ctr" fontAlgn="b"/>
-                      <a:r>
-                        <a:rPr lang="da-DK" sz="1400" u="none" strike="noStrike">
-                          <a:effectLst/>
-                        </a:rPr>
-                        <a:t> </a:t>
-                      </a:r>
-                      <a:endParaRPr lang="da-DK" sz="1400" b="0" i="0" u="none" strike="noStrike">
-                        <a:solidFill>
-                          <a:srgbClr val="000000"/>
-                        </a:solidFill>
-                        <a:effectLst/>
-                        <a:latin typeface="Calibri" panose="020F0502020204030204" pitchFamily="34" charset="0"/>
-                      </a:endParaRPr>
-                    </a:p>
-                  </a:txBody>
-                  <a:tcPr marL="11450" marR="11450" marT="11450" marB="0" anchor="b"/>
-                </a:tc>
-                <a:tc>
-                  <a:txBody>
-                    <a:bodyPr/>
-                    <a:lstStyle/>
-                    <a:p>
-                      <a:pPr algn="ctr" fontAlgn="b"/>
-                      <a:r>
-                        <a:rPr lang="da-DK" sz="1400" u="none" strike="noStrike">
-                          <a:effectLst/>
-                        </a:rPr>
-                        <a:t> </a:t>
-                      </a:r>
-                      <a:endParaRPr lang="da-DK" sz="1400" b="0" i="0" u="none" strike="noStrike">
-                        <a:solidFill>
-                          <a:srgbClr val="000000"/>
-                        </a:solidFill>
-                        <a:effectLst/>
-                        <a:latin typeface="Calibri" panose="020F0502020204030204" pitchFamily="34" charset="0"/>
-                      </a:endParaRPr>
-                    </a:p>
-                  </a:txBody>
-                  <a:tcPr marL="11450" marR="11450" marT="11450" marB="0" anchor="b"/>
-                </a:tc>
-                <a:tc>
-                  <a:txBody>
-                    <a:bodyPr/>
-                    <a:lstStyle/>
-                    <a:p>
-                      <a:pPr algn="ctr" fontAlgn="b"/>
-                      <a:r>
-                        <a:rPr lang="da-DK" sz="1400" u="none" strike="noStrike">
-                          <a:effectLst/>
-                        </a:rPr>
-                        <a:t> </a:t>
-                      </a:r>
-                      <a:endParaRPr lang="da-DK" sz="1400" b="0" i="0" u="none" strike="noStrike">
-                        <a:solidFill>
-                          <a:srgbClr val="000000"/>
-                        </a:solidFill>
-                        <a:effectLst/>
-                        <a:latin typeface="Calibri" panose="020F0502020204030204" pitchFamily="34" charset="0"/>
-                      </a:endParaRPr>
-                    </a:p>
-                  </a:txBody>
-                  <a:tcPr marL="11450" marR="11450" marT="11450" marB="0" anchor="b"/>
-                </a:tc>
-                <a:tc>
-                  <a:txBody>
-                    <a:bodyPr/>
-                    <a:lstStyle/>
-                    <a:p>
-                      <a:pPr algn="ctr" fontAlgn="b"/>
-                      <a:r>
-                        <a:rPr lang="da-DK" sz="1400" u="none" strike="noStrike">
-                          <a:effectLst/>
-                        </a:rPr>
-                        <a:t>0</a:t>
-                      </a:r>
-                      <a:endParaRPr lang="da-DK" sz="1400" b="0" i="0" u="none" strike="noStrike">
-                        <a:solidFill>
-                          <a:srgbClr val="000000"/>
-                        </a:solidFill>
-                        <a:effectLst/>
-                        <a:latin typeface="Calibri" panose="020F0502020204030204" pitchFamily="34" charset="0"/>
-                      </a:endParaRPr>
-                    </a:p>
-                  </a:txBody>
-                  <a:tcPr marL="11450" marR="11450" marT="11450" marB="0" anchor="b"/>
-                </a:tc>
-                <a:extLst>
-                  <a:ext uri="{0D108BD9-81ED-4DB2-BD59-A6C34878D82A}">
-                    <a16:rowId xmlns:a16="http://schemas.microsoft.com/office/drawing/2014/main" val="2657449032"/>
-                  </a:ext>
-                </a:extLst>
-              </a:tr>
-              <a:tr h="275266">
-                <a:tc>
-                  <a:txBody>
-                    <a:bodyPr/>
-                    <a:lstStyle/>
-                    <a:p>
-                      <a:pPr algn="ctr" fontAlgn="b"/>
-                      <a:r>
-                        <a:rPr lang="da-DK" sz="1400" u="none" strike="noStrike">
-                          <a:effectLst/>
-                        </a:rPr>
-                        <a:t> </a:t>
-                      </a:r>
-                      <a:endParaRPr lang="da-DK" sz="1400" b="0" i="0" u="none" strike="noStrike">
-                        <a:solidFill>
-                          <a:srgbClr val="000000"/>
-                        </a:solidFill>
-                        <a:effectLst/>
-                        <a:latin typeface="Calibri" panose="020F0502020204030204" pitchFamily="34" charset="0"/>
-                      </a:endParaRPr>
-                    </a:p>
-                  </a:txBody>
-                  <a:tcPr marL="11450" marR="11450" marT="11450" marB="0" anchor="b"/>
-                </a:tc>
-                <a:tc>
-                  <a:txBody>
-                    <a:bodyPr/>
-                    <a:lstStyle/>
-                    <a:p>
-                      <a:pPr algn="ctr" fontAlgn="b"/>
-                      <a:r>
-                        <a:rPr lang="da-DK" sz="1400" u="none" strike="noStrike">
-                          <a:effectLst/>
-                        </a:rPr>
-                        <a:t> </a:t>
-                      </a:r>
-                      <a:endParaRPr lang="da-DK" sz="1400" b="0" i="0" u="none" strike="noStrike">
-                        <a:solidFill>
-                          <a:srgbClr val="000000"/>
-                        </a:solidFill>
-                        <a:effectLst/>
-                        <a:latin typeface="Calibri" panose="020F0502020204030204" pitchFamily="34" charset="0"/>
-                      </a:endParaRPr>
-                    </a:p>
-                  </a:txBody>
-                  <a:tcPr marL="11450" marR="11450" marT="11450" marB="0" anchor="b"/>
-                </a:tc>
-                <a:tc>
-                  <a:txBody>
-                    <a:bodyPr/>
-                    <a:lstStyle/>
-                    <a:p>
-                      <a:pPr algn="ctr" fontAlgn="b"/>
-                      <a:r>
-                        <a:rPr lang="da-DK" sz="1400" u="none" strike="noStrike">
-                          <a:effectLst/>
-                        </a:rPr>
-                        <a:t> </a:t>
-                      </a:r>
-                      <a:endParaRPr lang="da-DK" sz="1400" b="0" i="0" u="none" strike="noStrike">
-                        <a:solidFill>
-                          <a:srgbClr val="000000"/>
-                        </a:solidFill>
-                        <a:effectLst/>
-                        <a:latin typeface="Calibri" panose="020F0502020204030204" pitchFamily="34" charset="0"/>
-                      </a:endParaRPr>
-                    </a:p>
-                  </a:txBody>
-                  <a:tcPr marL="11450" marR="11450" marT="11450" marB="0" anchor="b"/>
-                </a:tc>
-                <a:tc>
-                  <a:txBody>
-                    <a:bodyPr/>
-                    <a:lstStyle/>
-                    <a:p>
-                      <a:pPr algn="ctr" fontAlgn="b"/>
-                      <a:r>
-                        <a:rPr lang="da-DK" sz="1400" u="none" strike="noStrike" dirty="0">
-                          <a:effectLst/>
-                        </a:rPr>
-                        <a:t>0</a:t>
                       </a:r>
                       <a:endParaRPr lang="da-DK" sz="1400" b="0" i="0" u="none" strike="noStrike" dirty="0">
                         <a:solidFill>
@@ -9583,7 +9187,7 @@
                 </a:tc>
                 <a:extLst>
                   <a:ext uri="{0D108BD9-81ED-4DB2-BD59-A6C34878D82A}">
-                    <a16:rowId xmlns:a16="http://schemas.microsoft.com/office/drawing/2014/main" val="732014970"/>
+                    <a16:rowId xmlns:a16="http://schemas.microsoft.com/office/drawing/2014/main" val="1642408541"/>
                   </a:ext>
                 </a:extLst>
               </a:tr>
@@ -10568,7 +10172,7 @@
             <p:ph idx="1"/>
             <p:extLst>
               <p:ext uri="{D42A27DB-BD31-4B8C-83A1-F6EECF244321}">
-                <p14:modId xmlns:p14="http://schemas.microsoft.com/office/powerpoint/2010/main" val="1920325065"/>
+                <p14:modId xmlns:p14="http://schemas.microsoft.com/office/powerpoint/2010/main" val="3167401577"/>
               </p:ext>
             </p:extLst>
           </p:nvPr>
@@ -11169,12 +10773,12 @@
                     <a:p>
                       <a:pPr algn="ctr" fontAlgn="b"/>
                       <a:r>
-                        <a:rPr lang="da-DK" sz="800" u="none" strike="noStrike">
+                        <a:rPr lang="da-DK" sz="800" u="none" strike="noStrike" dirty="0">
                           <a:effectLst/>
                         </a:rPr>
                         <a:t>Sørger for at spørge ind til gruppe medlemmerne hvis der ikke er nogen der giver lyd fra sig i noget tid</a:t>
                       </a:r>
-                      <a:endParaRPr lang="da-DK" sz="800" b="0" i="0" u="none" strike="noStrike">
+                      <a:endParaRPr lang="da-DK" sz="800" b="0" i="0" u="none" strike="noStrike" dirty="0">
                         <a:solidFill>
                           <a:srgbClr val="000000"/>
                         </a:solidFill>
@@ -11314,12 +10918,18 @@
                     <a:p>
                       <a:pPr algn="ctr" fontAlgn="b"/>
                       <a:r>
-                        <a:rPr lang="da-DK" sz="800" u="none" strike="noStrike">
+                        <a:rPr lang="da-DK" sz="800" u="none" strike="noStrike" dirty="0" err="1">
                           <a:effectLst/>
                         </a:rPr>
-                        <a:t>Afsprit, hold afstand, tak hensyn</a:t>
+                        <a:t>Afsprit</a:t>
                       </a:r>
-                      <a:endParaRPr lang="da-DK" sz="800" b="0" i="0" u="none" strike="noStrike">
+                      <a:r>
+                        <a:rPr lang="da-DK" sz="800" u="none" strike="noStrike" dirty="0">
+                          <a:effectLst/>
+                        </a:rPr>
+                        <a:t>, hold afstand, tag hensyn</a:t>
+                      </a:r>
+                      <a:endParaRPr lang="da-DK" sz="800" b="0" i="0" u="none" strike="noStrike" dirty="0">
                         <a:solidFill>
                           <a:srgbClr val="000000"/>
                         </a:solidFill>
@@ -12078,58 +11688,12 @@
                     <a:p>
                       <a:pPr algn="ctr" fontAlgn="b"/>
                       <a:r>
-                        <a:rPr lang="da-DK" sz="800" u="none" strike="noStrike">
+                        <a:rPr lang="da-DK" sz="800" u="none" strike="noStrike" dirty="0">
                           <a:effectLst/>
                         </a:rPr>
                         <a:t>En person der går op i at tests laves</a:t>
                       </a:r>
-                      <a:endParaRPr lang="da-DK" sz="800" b="0" i="0" u="none" strike="noStrike">
-                        <a:solidFill>
-                          <a:srgbClr val="000000"/>
-                        </a:solidFill>
-                        <a:effectLst/>
-                        <a:latin typeface="Calibri" panose="020F0502020204030204" pitchFamily="34" charset="0"/>
-                      </a:endParaRPr>
-                    </a:p>
-                  </a:txBody>
-                  <a:tcPr marL="5385" marR="5385" marT="5385" marB="0" anchor="b"/>
-                </a:tc>
-                <a:tc>
-                  <a:txBody>
-                    <a:bodyPr/>
-                    <a:lstStyle/>
-                    <a:p>
-                      <a:pPr algn="ctr" fontAlgn="b"/>
-                      <a:r>
-                        <a:rPr lang="da-DK" sz="800" u="none" strike="noStrike">
-                          <a:effectLst/>
-                        </a:rPr>
-                        <a:t> </a:t>
-                      </a:r>
-                      <a:endParaRPr lang="da-DK" sz="800" b="0" i="0" u="none" strike="noStrike">
-                        <a:solidFill>
-                          <a:srgbClr val="000000"/>
-                        </a:solidFill>
-                        <a:effectLst/>
-                        <a:latin typeface="Calibri" panose="020F0502020204030204" pitchFamily="34" charset="0"/>
-                      </a:endParaRPr>
-                    </a:p>
-                  </a:txBody>
-                  <a:tcPr marL="5385" marR="5385" marT="5385" marB="0" anchor="b"/>
-                </a:tc>
-                <a:tc>
-                  <a:txBody>
-                    <a:bodyPr/>
-                    <a:lstStyle/>
-                    <a:p>
-                      <a:pPr algn="ctr" fontAlgn="b"/>
-                      <a:r>
-                        <a:rPr lang="da-DK" sz="800" u="none" strike="noStrike">
-                          <a:effectLst/>
-                        </a:rPr>
-                        <a:t> </a:t>
-                      </a:r>
-                      <a:endParaRPr lang="da-DK" sz="800" b="0" i="0" u="none" strike="noStrike">
+                      <a:endParaRPr lang="da-DK" sz="800" b="0" i="0" u="none" strike="noStrike" dirty="0">
                         <a:solidFill>
                           <a:srgbClr val="000000"/>
                         </a:solidFill>
@@ -12150,7 +11714,53 @@
                         <a:rPr lang="da-DK" sz="800" u="none" strike="noStrike" dirty="0">
                           <a:effectLst/>
                         </a:rPr>
-                        <a:t> </a:t>
+                        <a:t>Mathias </a:t>
+                      </a:r>
+                      <a:endParaRPr lang="da-DK" sz="800" b="0" i="0" u="none" strike="noStrike" dirty="0">
+                        <a:solidFill>
+                          <a:srgbClr val="000000"/>
+                        </a:solidFill>
+                        <a:effectLst/>
+                        <a:latin typeface="Calibri" panose="020F0502020204030204" pitchFamily="34" charset="0"/>
+                      </a:endParaRPr>
+                    </a:p>
+                  </a:txBody>
+                  <a:tcPr marL="5385" marR="5385" marT="5385" marB="0" anchor="b"/>
+                </a:tc>
+                <a:tc>
+                  <a:txBody>
+                    <a:bodyPr/>
+                    <a:lstStyle/>
+                    <a:p>
+                      <a:pPr algn="ctr" fontAlgn="b"/>
+                      <a:r>
+                        <a:rPr lang="da-DK" sz="800" u="none" strike="noStrike" dirty="0">
+                          <a:effectLst/>
+                        </a:rPr>
+                        <a:t>Sikre at der løbene testes, og at der er opsat nogle procedure </a:t>
+                      </a:r>
+                      <a:endParaRPr lang="da-DK" sz="800" b="0" i="0" u="none" strike="noStrike" dirty="0">
+                        <a:solidFill>
+                          <a:srgbClr val="000000"/>
+                        </a:solidFill>
+                        <a:effectLst/>
+                        <a:latin typeface="Calibri" panose="020F0502020204030204" pitchFamily="34" charset="0"/>
+                      </a:endParaRPr>
+                    </a:p>
+                  </a:txBody>
+                  <a:tcPr marL="5385" marR="5385" marT="5385" marB="0" anchor="b"/>
+                </a:tc>
+                <a:tc>
+                  <a:txBody>
+                    <a:bodyPr/>
+                    <a:lstStyle/>
+                    <a:p>
+                      <a:pPr algn="ctr" fontAlgn="b"/>
+                      <a:r>
+                        <a:rPr lang="da-DK" sz="800" u="none" strike="noStrike" dirty="0">
+                          <a:effectLst/>
+                        </a:rPr>
+                        <a:t>Mohamad </a:t>
                       </a:r>
                       <a:endParaRPr lang="da-DK" sz="800" b="0" i="0" u="none" strike="noStrike" dirty="0">
                         <a:solidFill>

</xml_diff>